<commit_message>
Update Casino Murmeln Präsentation Dienstag.pptx
</commit_message>
<xml_diff>
--- a/Casino Murmeln Präsentation Dienstag.pptx
+++ b/Casino Murmeln Präsentation Dienstag.pptx
@@ -303,7 +303,7 @@
           <a:p>
             <a:fld id="{D689E641-CA97-4319-9345-929272670F97}" type="datetimeFigureOut">
               <a:rPr lang="de-DE" smtClean="0"/>
-              <a:t>16.01.2023</a:t>
+              <a:t>20.01.2023</a:t>
             </a:fld>
             <a:endParaRPr lang="de-DE"/>
           </a:p>
@@ -578,7 +578,7 @@
           <a:p>
             <a:fld id="{D689E641-CA97-4319-9345-929272670F97}" type="datetimeFigureOut">
               <a:rPr lang="de-DE" smtClean="0"/>
-              <a:t>16.01.2023</a:t>
+              <a:t>20.01.2023</a:t>
             </a:fld>
             <a:endParaRPr lang="de-DE"/>
           </a:p>
@@ -772,7 +772,7 @@
           <a:p>
             <a:fld id="{D689E641-CA97-4319-9345-929272670F97}" type="datetimeFigureOut">
               <a:rPr lang="de-DE" smtClean="0"/>
-              <a:t>16.01.2023</a:t>
+              <a:t>20.01.2023</a:t>
             </a:fld>
             <a:endParaRPr lang="de-DE"/>
           </a:p>
@@ -1045,7 +1045,7 @@
           <a:p>
             <a:fld id="{D689E641-CA97-4319-9345-929272670F97}" type="datetimeFigureOut">
               <a:rPr lang="de-DE" smtClean="0"/>
-              <a:t>16.01.2023</a:t>
+              <a:t>20.01.2023</a:t>
             </a:fld>
             <a:endParaRPr lang="de-DE"/>
           </a:p>
@@ -1386,7 +1386,7 @@
           <a:p>
             <a:fld id="{D689E641-CA97-4319-9345-929272670F97}" type="datetimeFigureOut">
               <a:rPr lang="de-DE" smtClean="0"/>
-              <a:t>16.01.2023</a:t>
+              <a:t>20.01.2023</a:t>
             </a:fld>
             <a:endParaRPr lang="de-DE"/>
           </a:p>
@@ -2009,7 +2009,7 @@
           <a:p>
             <a:fld id="{D689E641-CA97-4319-9345-929272670F97}" type="datetimeFigureOut">
               <a:rPr lang="de-DE" smtClean="0"/>
-              <a:t>16.01.2023</a:t>
+              <a:t>20.01.2023</a:t>
             </a:fld>
             <a:endParaRPr lang="de-DE"/>
           </a:p>
@@ -2869,7 +2869,7 @@
           <a:p>
             <a:fld id="{D689E641-CA97-4319-9345-929272670F97}" type="datetimeFigureOut">
               <a:rPr lang="de-DE" smtClean="0"/>
-              <a:t>16.01.2023</a:t>
+              <a:t>20.01.2023</a:t>
             </a:fld>
             <a:endParaRPr lang="de-DE"/>
           </a:p>
@@ -3039,7 +3039,7 @@
           <a:p>
             <a:fld id="{D689E641-CA97-4319-9345-929272670F97}" type="datetimeFigureOut">
               <a:rPr lang="de-DE" smtClean="0"/>
-              <a:t>16.01.2023</a:t>
+              <a:t>20.01.2023</a:t>
             </a:fld>
             <a:endParaRPr lang="de-DE"/>
           </a:p>
@@ -3219,7 +3219,7 @@
           <a:p>
             <a:fld id="{D689E641-CA97-4319-9345-929272670F97}" type="datetimeFigureOut">
               <a:rPr lang="de-DE" smtClean="0"/>
-              <a:t>16.01.2023</a:t>
+              <a:t>20.01.2023</a:t>
             </a:fld>
             <a:endParaRPr lang="de-DE"/>
           </a:p>
@@ -3389,7 +3389,7 @@
           <a:p>
             <a:fld id="{D689E641-CA97-4319-9345-929272670F97}" type="datetimeFigureOut">
               <a:rPr lang="de-DE" smtClean="0"/>
-              <a:t>16.01.2023</a:t>
+              <a:t>20.01.2023</a:t>
             </a:fld>
             <a:endParaRPr lang="de-DE"/>
           </a:p>
@@ -3636,7 +3636,7 @@
           <a:p>
             <a:fld id="{D689E641-CA97-4319-9345-929272670F97}" type="datetimeFigureOut">
               <a:rPr lang="de-DE" smtClean="0"/>
-              <a:t>16.01.2023</a:t>
+              <a:t>20.01.2023</a:t>
             </a:fld>
             <a:endParaRPr lang="de-DE"/>
           </a:p>
@@ -3928,7 +3928,7 @@
           <a:p>
             <a:fld id="{D689E641-CA97-4319-9345-929272670F97}" type="datetimeFigureOut">
               <a:rPr lang="de-DE" smtClean="0"/>
-              <a:t>16.01.2023</a:t>
+              <a:t>20.01.2023</a:t>
             </a:fld>
             <a:endParaRPr lang="de-DE"/>
           </a:p>
@@ -4372,7 +4372,7 @@
           <a:p>
             <a:fld id="{D689E641-CA97-4319-9345-929272670F97}" type="datetimeFigureOut">
               <a:rPr lang="de-DE" smtClean="0"/>
-              <a:t>16.01.2023</a:t>
+              <a:t>20.01.2023</a:t>
             </a:fld>
             <a:endParaRPr lang="de-DE"/>
           </a:p>
@@ -4490,7 +4490,7 @@
           <a:p>
             <a:fld id="{D689E641-CA97-4319-9345-929272670F97}" type="datetimeFigureOut">
               <a:rPr lang="de-DE" smtClean="0"/>
-              <a:t>16.01.2023</a:t>
+              <a:t>20.01.2023</a:t>
             </a:fld>
             <a:endParaRPr lang="de-DE"/>
           </a:p>
@@ -4585,7 +4585,7 @@
           <a:p>
             <a:fld id="{D689E641-CA97-4319-9345-929272670F97}" type="datetimeFigureOut">
               <a:rPr lang="de-DE" smtClean="0"/>
-              <a:t>16.01.2023</a:t>
+              <a:t>20.01.2023</a:t>
             </a:fld>
             <a:endParaRPr lang="de-DE"/>
           </a:p>
@@ -4864,7 +4864,7 @@
           <a:p>
             <a:fld id="{D689E641-CA97-4319-9345-929272670F97}" type="datetimeFigureOut">
               <a:rPr lang="de-DE" smtClean="0"/>
-              <a:t>16.01.2023</a:t>
+              <a:t>20.01.2023</a:t>
             </a:fld>
             <a:endParaRPr lang="de-DE"/>
           </a:p>
@@ -5139,7 +5139,7 @@
           <a:p>
             <a:fld id="{D689E641-CA97-4319-9345-929272670F97}" type="datetimeFigureOut">
               <a:rPr lang="de-DE" smtClean="0"/>
-              <a:t>16.01.2023</a:t>
+              <a:t>20.01.2023</a:t>
             </a:fld>
             <a:endParaRPr lang="de-DE"/>
           </a:p>
@@ -5568,7 +5568,7 @@
           <a:p>
             <a:fld id="{D689E641-CA97-4319-9345-929272670F97}" type="datetimeFigureOut">
               <a:rPr lang="de-DE" smtClean="0"/>
-              <a:t>16.01.2023</a:t>
+              <a:t>20.01.2023</a:t>
             </a:fld>
             <a:endParaRPr lang="de-DE"/>
           </a:p>
@@ -7540,7 +7540,7 @@
         </p:spPr>
         <p:txBody>
           <a:bodyPr>
-            <a:normAutofit fontScale="40000" lnSpcReduction="20000"/>
+            <a:normAutofit fontScale="32500" lnSpcReduction="20000"/>
           </a:bodyPr>
           <a:lstStyle/>
           <a:p>
@@ -8130,6 +8130,53 @@
               </a:rPr>
               <a:t>https://de.pngtree.com/freebackground/red-and-casino-card-illustration-background-design_1491728.html?sol=downref&amp;id=bef</a:t>
             </a:r>
+            <a:endParaRPr lang="de-DE" sz="1700" u="sng" dirty="0">
+              <a:solidFill>
+                <a:srgbClr val="0563C1"/>
+              </a:solidFill>
+              <a:effectLst/>
+              <a:latin typeface="Calibri" panose="020F0502020204030204" pitchFamily="34" charset="0"/>
+              <a:ea typeface="Calibri" panose="020F0502020204030204" pitchFamily="34" charset="0"/>
+              <a:cs typeface="Times New Roman" panose="02020603050405020304" pitchFamily="18" charset="0"/>
+            </a:endParaRPr>
+          </a:p>
+          <a:p>
+            <a:pPr marL="0" indent="0">
+              <a:lnSpc>
+                <a:spcPct val="120000"/>
+              </a:lnSpc>
+              <a:spcAft>
+                <a:spcPts val="800"/>
+              </a:spcAft>
+              <a:buNone/>
+            </a:pPr>
+            <a:r>
+              <a:rPr lang="de-DE" sz="1700">
+                <a:effectLst/>
+                <a:latin typeface="Calibri" panose="020F0502020204030204" pitchFamily="34" charset="0"/>
+                <a:ea typeface="Calibri" panose="020F0502020204030204" pitchFamily="34" charset="0"/>
+                <a:cs typeface="Times New Roman" panose="02020603050405020304" pitchFamily="18" charset="0"/>
+                <a:hlinkClick r:id="rId20"/>
+              </a:rPr>
+              <a:t>https://www.kenney.nl/assets/kenney-fonts</a:t>
+            </a:r>
+            <a:endParaRPr lang="de-DE" sz="1700">
+              <a:effectLst/>
+              <a:latin typeface="Calibri" panose="020F0502020204030204" pitchFamily="34" charset="0"/>
+              <a:ea typeface="Calibri" panose="020F0502020204030204" pitchFamily="34" charset="0"/>
+              <a:cs typeface="Times New Roman" panose="02020603050405020304" pitchFamily="18" charset="0"/>
+            </a:endParaRPr>
+          </a:p>
+          <a:p>
+            <a:pPr marL="0" indent="0">
+              <a:lnSpc>
+                <a:spcPct val="120000"/>
+              </a:lnSpc>
+              <a:spcAft>
+                <a:spcPts val="800"/>
+              </a:spcAft>
+              <a:buNone/>
+            </a:pPr>
             <a:endParaRPr lang="de-DE" sz="1700" dirty="0">
               <a:effectLst/>
               <a:latin typeface="Calibri" panose="020F0502020204030204" pitchFamily="34" charset="0"/>

</xml_diff>